<commit_message>
typo: trees-spanning.pptx --spanning subgraph need not be connected
</commit_message>
<xml_diff>
--- a/spring12/slidesS12/trees-spanning.pptx
+++ b/spring12/slidesS12/trees-spanning.pptx
@@ -3979,13 +3979,6 @@
               </a:rPr>
               <a:t>Trees</a:t>
             </a:r>
-            <a:endParaRPr lang="en-US" sz="11500" b="1" dirty="0" smtClean="0">
-              <a:solidFill>
-                <a:schemeClr val="tx2"/>
-              </a:solidFill>
-              <a:latin typeface="Comic Sans MS"/>
-              <a:cs typeface="Comic Sans MS"/>
-            </a:endParaRPr>
           </a:p>
         </p:txBody>
       </p:sp>
@@ -10978,8 +10971,8 @@
         </p:nvSpPr>
         <p:spPr>
           <a:xfrm>
-            <a:off x="633413" y="872070"/>
-            <a:ext cx="8001000" cy="5029200"/>
+            <a:off x="225779" y="1100665"/>
+            <a:ext cx="8692443" cy="4628445"/>
           </a:xfrm>
         </p:spPr>
         <p:txBody>
@@ -10991,13 +10984,13 @@
               <a:buNone/>
             </a:pPr>
             <a:r>
-              <a:rPr lang="en-US" altLang="zh-CN" sz="4400" dirty="0" smtClean="0">
+              <a:rPr lang="en-US" altLang="zh-CN" sz="4800" dirty="0" smtClean="0">
                 <a:ea typeface="宋体" pitchFamily="2" charset="-122"/>
               </a:rPr>
               <a:t>A </a:t>
             </a:r>
             <a:r>
-              <a:rPr lang="en-US" altLang="zh-CN" sz="4400" dirty="0" smtClean="0">
+              <a:rPr lang="en-US" altLang="zh-CN" sz="4800" dirty="0" smtClean="0">
                 <a:solidFill>
                   <a:srgbClr val="930093"/>
                 </a:solidFill>
@@ -11006,7 +10999,7 @@
               <a:t>spanning </a:t>
             </a:r>
             <a:r>
-              <a:rPr lang="en-US" altLang="zh-CN" sz="4400" dirty="0" err="1" smtClean="0">
+              <a:rPr lang="en-US" altLang="zh-CN" sz="4800" dirty="0" err="1" smtClean="0">
                 <a:solidFill>
                   <a:srgbClr val="930093"/>
                 </a:solidFill>
@@ -11015,10 +11008,16 @@
               <a:t>subgraph</a:t>
             </a:r>
             <a:r>
-              <a:rPr lang="en-US" altLang="zh-CN" sz="4400" dirty="0" smtClean="0">
+              <a:rPr lang="en-US" altLang="zh-CN" sz="4800" dirty="0" smtClean="0">
                 <a:ea typeface="宋体" pitchFamily="2" charset="-122"/>
               </a:rPr>
-              <a:t> of a </a:t>
+              <a:t> </a:t>
+            </a:r>
+            <a:r>
+              <a:rPr lang="en-US" altLang="zh-CN" sz="4800" dirty="0" smtClean="0">
+                <a:ea typeface="宋体" pitchFamily="2" charset="-122"/>
+              </a:rPr>
+              <a:t>of graph </a:t>
             </a:r>
           </a:p>
           <a:p>
@@ -11027,13 +11026,7 @@
               <a:buNone/>
             </a:pPr>
             <a:r>
-              <a:rPr lang="en-US" altLang="zh-CN" sz="4400" dirty="0" smtClean="0">
-                <a:ea typeface="宋体" pitchFamily="2" charset="-122"/>
-              </a:rPr>
-              <a:t>graph </a:t>
-            </a:r>
-            <a:r>
-              <a:rPr lang="en-US" altLang="zh-CN" sz="4400" dirty="0" smtClean="0">
+              <a:rPr lang="en-US" altLang="zh-CN" sz="4800" dirty="0" smtClean="0">
                 <a:solidFill>
                   <a:srgbClr val="0000FF"/>
                 </a:solidFill>
@@ -11042,10 +11035,52 @@
               <a:t>G</a:t>
             </a:r>
             <a:r>
-              <a:rPr lang="en-US" altLang="zh-CN" sz="4400" dirty="0" smtClean="0">
+              <a:rPr lang="en-US" altLang="zh-CN" sz="4800" dirty="0" smtClean="0">
                 <a:ea typeface="宋体" pitchFamily="2" charset="-122"/>
               </a:rPr>
-              <a:t> is a connected </a:t>
+              <a:t> </a:t>
+            </a:r>
+            <a:r>
+              <a:rPr lang="en-US" altLang="zh-CN" sz="4800" dirty="0" smtClean="0">
+                <a:ea typeface="宋体" pitchFamily="2" charset="-122"/>
+              </a:rPr>
+              <a:t>is </a:t>
+            </a:r>
+            <a:r>
+              <a:rPr lang="en-US" altLang="zh-CN" sz="4800" dirty="0" smtClean="0">
+                <a:ea typeface="宋体" pitchFamily="2" charset="-122"/>
+              </a:rPr>
+              <a:t>a </a:t>
+            </a:r>
+            <a:r>
+              <a:rPr lang="en-US" altLang="zh-CN" sz="4800" dirty="0" err="1" smtClean="0">
+                <a:ea typeface="宋体" pitchFamily="2" charset="-122"/>
+              </a:rPr>
+              <a:t>subgraph</a:t>
+            </a:r>
+            <a:r>
+              <a:rPr lang="en-US" altLang="zh-CN" sz="4800" dirty="0" smtClean="0">
+                <a:ea typeface="宋体" pitchFamily="2" charset="-122"/>
+              </a:rPr>
+              <a:t> </a:t>
+            </a:r>
+            <a:r>
+              <a:rPr lang="en-US" altLang="zh-CN" sz="4800" dirty="0" smtClean="0">
+                <a:ea typeface="宋体" pitchFamily="2" charset="-122"/>
+              </a:rPr>
+              <a:t>that </a:t>
+            </a:r>
+            <a:r>
+              <a:rPr lang="en-US" altLang="zh-CN" sz="4800" dirty="0" smtClean="0">
+                <a:ea typeface="宋体" pitchFamily="2" charset="-122"/>
+              </a:rPr>
+              <a:t>has all</a:t>
+            </a:r>
+            <a:r>
+              <a:rPr lang="en-US" altLang="zh-CN" sz="4800" dirty="0" smtClean="0">
+                <a:ea typeface="宋体" pitchFamily="2" charset="-122"/>
+              </a:rPr>
+              <a:t> </a:t>
             </a:r>
           </a:p>
           <a:p>
@@ -11054,58 +11089,43 @@
               <a:buNone/>
             </a:pPr>
             <a:r>
-              <a:rPr lang="en-US" altLang="zh-CN" sz="4400" dirty="0" err="1" smtClean="0">
+              <a:rPr lang="en-US" altLang="zh-CN" sz="4800" dirty="0" smtClean="0">
                 <a:ea typeface="宋体" pitchFamily="2" charset="-122"/>
               </a:rPr>
-              <a:t>subgraph</a:t>
-            </a:r>
-            <a:r>
-              <a:rPr lang="en-US" altLang="zh-CN" sz="4400" dirty="0" smtClean="0">
+              <a:t>the </a:t>
+            </a:r>
+            <a:r>
+              <a:rPr lang="en-US" altLang="zh-CN" sz="4800" dirty="0" smtClean="0">
                 <a:ea typeface="宋体" pitchFamily="2" charset="-122"/>
               </a:rPr>
-              <a:t> that contains all</a:t>
-            </a:r>
-          </a:p>
-          <a:p>
-            <a:pPr eaLnBrk="1" hangingPunct="1">
-              <a:buFontTx/>
-              <a:buNone/>
-            </a:pPr>
-            <a:r>
-              <a:rPr lang="en-US" altLang="zh-CN" sz="4400" dirty="0" smtClean="0">
-                <a:ea typeface="宋体" pitchFamily="2" charset="-122"/>
-              </a:rPr>
-              <a:t>the vertices of</a:t>
-            </a:r>
-            <a:r>
-              <a:rPr lang="en-US" altLang="zh-CN" sz="4400" dirty="0" smtClean="0">
+              <a:t>vertices of</a:t>
+            </a:r>
+            <a:r>
+              <a:rPr lang="en-US" altLang="zh-CN" sz="4800" dirty="0" smtClean="0">
                 <a:solidFill>
                   <a:srgbClr val="0000FF"/>
                 </a:solidFill>
                 <a:ea typeface="宋体" pitchFamily="2" charset="-122"/>
               </a:rPr>
-              <a:t> G</a:t>
-            </a:r>
-            <a:r>
-              <a:rPr lang="en-US" altLang="zh-CN" sz="4400" dirty="0" smtClean="0">
+              <a:t> </a:t>
+            </a:r>
+            <a:r>
+              <a:rPr lang="en-US" altLang="zh-CN" sz="4800" dirty="0" smtClean="0">
+                <a:solidFill>
+                  <a:srgbClr val="0000FF"/>
+                </a:solidFill>
                 <a:ea typeface="宋体" pitchFamily="2" charset="-122"/>
               </a:rPr>
-              <a:t>.</a:t>
-            </a:r>
-          </a:p>
-          <a:p>
-            <a:pPr eaLnBrk="1" hangingPunct="1">
-              <a:buFontTx/>
-              <a:buNone/>
-            </a:pPr>
-            <a:r>
-              <a:rPr lang="en-US" altLang="zh-CN" sz="4400" dirty="0" smtClean="0">
+              <a:t>G</a:t>
+            </a:r>
+            <a:r>
+              <a:rPr lang="en-US" altLang="zh-CN" sz="4800" dirty="0" smtClean="0">
                 <a:ea typeface="宋体" pitchFamily="2" charset="-122"/>
               </a:rPr>
-              <a:t>A </a:t>
-            </a:r>
-            <a:r>
-              <a:rPr lang="en-US" altLang="zh-CN" sz="4400" dirty="0" smtClean="0">
+              <a:t>. A </a:t>
+            </a:r>
+            <a:r>
+              <a:rPr lang="en-US" altLang="zh-CN" sz="4800" dirty="0" smtClean="0">
                 <a:solidFill>
                   <a:srgbClr val="660066"/>
                 </a:solidFill>
@@ -11114,20 +11134,20 @@
               <a:t>s</a:t>
             </a:r>
             <a:r>
-              <a:rPr lang="en-US" altLang="zh-CN" sz="4400" dirty="0" smtClean="0">
+              <a:rPr lang="en-US" altLang="zh-CN" sz="4800" dirty="0" smtClean="0">
                 <a:solidFill>
                   <a:srgbClr val="930093"/>
                 </a:solidFill>
                 <a:ea typeface="宋体" pitchFamily="2" charset="-122"/>
               </a:rPr>
-              <a:t>panning tree</a:t>
-            </a:r>
-            <a:r>
-              <a:rPr lang="en-US" altLang="zh-CN" sz="4400" dirty="0" smtClean="0">
-                <a:ea typeface="宋体" pitchFamily="2" charset="-122"/>
-              </a:rPr>
-              <a:t> is a spanning </a:t>
-            </a:r>
+              <a:t>panning </a:t>
+            </a:r>
+            <a:endParaRPr lang="en-US" altLang="zh-CN" sz="4800" dirty="0" smtClean="0">
+              <a:solidFill>
+                <a:srgbClr val="930093"/>
+              </a:solidFill>
+              <a:ea typeface="宋体" pitchFamily="2" charset="-122"/>
+            </a:endParaRPr>
           </a:p>
           <a:p>
             <a:pPr eaLnBrk="1" hangingPunct="1">
@@ -11135,17 +11155,71 @@
               <a:buNone/>
             </a:pPr>
             <a:r>
-              <a:rPr lang="en-US" altLang="zh-CN" sz="4400" dirty="0" err="1" smtClean="0">
+              <a:rPr lang="en-US" altLang="zh-CN" sz="4800" dirty="0" smtClean="0">
+                <a:solidFill>
+                  <a:srgbClr val="930093"/>
+                </a:solidFill>
+                <a:ea typeface="宋体" pitchFamily="2" charset="-122"/>
+              </a:rPr>
+              <a:t>tree</a:t>
+            </a:r>
+            <a:r>
+              <a:rPr lang="en-US" altLang="zh-CN" sz="4800" dirty="0" smtClean="0">
+                <a:ea typeface="宋体" pitchFamily="2" charset="-122"/>
+              </a:rPr>
+              <a:t> </a:t>
+            </a:r>
+            <a:r>
+              <a:rPr lang="en-US" altLang="zh-CN" sz="4800" dirty="0" smtClean="0">
+                <a:ea typeface="宋体" pitchFamily="2" charset="-122"/>
+              </a:rPr>
+              <a:t>is a </a:t>
+            </a:r>
+            <a:r>
+              <a:rPr lang="en-US" altLang="zh-CN" sz="4800" dirty="0" smtClean="0">
+                <a:ea typeface="宋体" pitchFamily="2" charset="-122"/>
+              </a:rPr>
+              <a:t>spanning </a:t>
+            </a:r>
+            <a:r>
+              <a:rPr lang="en-US" altLang="zh-CN" sz="4800" dirty="0" err="1" smtClean="0">
                 <a:ea typeface="宋体" pitchFamily="2" charset="-122"/>
               </a:rPr>
               <a:t>subgraph</a:t>
             </a:r>
             <a:r>
-              <a:rPr lang="en-US" altLang="zh-CN" sz="4400" dirty="0" smtClean="0">
+              <a:rPr lang="en-US" altLang="zh-CN" sz="4800" dirty="0" smtClean="0">
                 <a:ea typeface="宋体" pitchFamily="2" charset="-122"/>
               </a:rPr>
-              <a:t> that is a tree</a:t>
-            </a:r>
+              <a:t> </a:t>
+            </a:r>
+          </a:p>
+          <a:p>
+            <a:pPr eaLnBrk="1" hangingPunct="1">
+              <a:buFontTx/>
+              <a:buNone/>
+            </a:pPr>
+            <a:r>
+              <a:rPr lang="en-US" altLang="zh-CN" sz="4800" dirty="0" smtClean="0">
+                <a:ea typeface="宋体" pitchFamily="2" charset="-122"/>
+              </a:rPr>
+              <a:t>that </a:t>
+            </a:r>
+            <a:r>
+              <a:rPr lang="en-US" altLang="zh-CN" sz="4800" dirty="0" smtClean="0">
+                <a:ea typeface="宋体" pitchFamily="2" charset="-122"/>
+              </a:rPr>
+              <a:t>is a </a:t>
+            </a:r>
+            <a:r>
+              <a:rPr lang="en-US" altLang="zh-CN" sz="4800" dirty="0" smtClean="0">
+                <a:ea typeface="宋体" pitchFamily="2" charset="-122"/>
+              </a:rPr>
+              <a:t>tree.</a:t>
+            </a:r>
+            <a:endParaRPr lang="en-US" altLang="zh-CN" sz="4800" dirty="0" smtClean="0">
+              <a:ea typeface="宋体" pitchFamily="2" charset="-122"/>
+            </a:endParaRPr>
           </a:p>
         </p:txBody>
       </p:sp>
@@ -11194,134 +11268,7 @@
   <p:timing>
     <p:tnLst>
       <p:par>
-        <p:cTn xmlns:p14="http://schemas.microsoft.com/office/powerpoint/2010/main" id="1" dur="indefinite" restart="never" nodeType="tmRoot">
-          <p:childTnLst>
-            <p:seq concurrent="1" nextAc="seek">
-              <p:cTn id="2" dur="indefinite" nodeType="mainSeq">
-                <p:childTnLst>
-                  <p:par>
-                    <p:cTn id="3" fill="hold">
-                      <p:stCondLst>
-                        <p:cond delay="indefinite"/>
-                      </p:stCondLst>
-                      <p:childTnLst>
-                        <p:par>
-                          <p:cTn id="4" fill="hold">
-                            <p:stCondLst>
-                              <p:cond delay="0"/>
-                            </p:stCondLst>
-                            <p:childTnLst>
-                              <p:par>
-                                <p:cTn id="5" presetID="9" presetClass="entr" presetSubtype="0" fill="hold" nodeType="clickEffect">
-                                  <p:stCondLst>
-                                    <p:cond delay="0"/>
-                                  </p:stCondLst>
-                                  <p:childTnLst>
-                                    <p:set>
-                                      <p:cBhvr>
-                                        <p:cTn id="6" dur="1" fill="hold">
-                                          <p:stCondLst>
-                                            <p:cond delay="0"/>
-                                          </p:stCondLst>
-                                        </p:cTn>
-                                        <p:tgtEl>
-                                          <p:spTgt spid="62467">
-                                            <p:txEl>
-                                              <p:pRg st="4" end="4"/>
-                                            </p:txEl>
-                                          </p:spTgt>
-                                        </p:tgtEl>
-                                        <p:attrNameLst>
-                                          <p:attrName>style.visibility</p:attrName>
-                                        </p:attrNameLst>
-                                      </p:cBhvr>
-                                      <p:to>
-                                        <p:strVal val="visible"/>
-                                      </p:to>
-                                    </p:set>
-                                    <p:animEffect transition="in" filter="dissolve">
-                                      <p:cBhvr>
-                                        <p:cTn id="7" dur="500"/>
-                                        <p:tgtEl>
-                                          <p:spTgt spid="62467">
-                                            <p:txEl>
-                                              <p:pRg st="4" end="4"/>
-                                            </p:txEl>
-                                          </p:spTgt>
-                                        </p:tgtEl>
-                                      </p:cBhvr>
-                                    </p:animEffect>
-                                  </p:childTnLst>
-                                </p:cTn>
-                              </p:par>
-                              <p:par>
-                                <p:cTn id="8" presetID="9" presetClass="entr" presetSubtype="0" fill="hold" nodeType="withEffect">
-                                  <p:stCondLst>
-                                    <p:cond delay="0"/>
-                                  </p:stCondLst>
-                                  <p:childTnLst>
-                                    <p:set>
-                                      <p:cBhvr>
-                                        <p:cTn id="9" dur="1" fill="hold">
-                                          <p:stCondLst>
-                                            <p:cond delay="0"/>
-                                          </p:stCondLst>
-                                        </p:cTn>
-                                        <p:tgtEl>
-                                          <p:spTgt spid="62467">
-                                            <p:txEl>
-                                              <p:pRg st="5" end="5"/>
-                                            </p:txEl>
-                                          </p:spTgt>
-                                        </p:tgtEl>
-                                        <p:attrNameLst>
-                                          <p:attrName>style.visibility</p:attrName>
-                                        </p:attrNameLst>
-                                      </p:cBhvr>
-                                      <p:to>
-                                        <p:strVal val="visible"/>
-                                      </p:to>
-                                    </p:set>
-                                    <p:animEffect transition="in" filter="dissolve">
-                                      <p:cBhvr>
-                                        <p:cTn id="10" dur="500"/>
-                                        <p:tgtEl>
-                                          <p:spTgt spid="62467">
-                                            <p:txEl>
-                                              <p:pRg st="5" end="5"/>
-                                            </p:txEl>
-                                          </p:spTgt>
-                                        </p:tgtEl>
-                                      </p:cBhvr>
-                                    </p:animEffect>
-                                  </p:childTnLst>
-                                </p:cTn>
-                              </p:par>
-                            </p:childTnLst>
-                          </p:cTn>
-                        </p:par>
-                      </p:childTnLst>
-                    </p:cTn>
-                  </p:par>
-                </p:childTnLst>
-              </p:cTn>
-              <p:prevCondLst>
-                <p:cond evt="onPrev" delay="0">
-                  <p:tgtEl>
-                    <p:sldTgt/>
-                  </p:tgtEl>
-                </p:cond>
-              </p:prevCondLst>
-              <p:nextCondLst>
-                <p:cond evt="onNext" delay="0">
-                  <p:tgtEl>
-                    <p:sldTgt/>
-                  </p:tgtEl>
-                </p:cond>
-              </p:nextCondLst>
-            </p:seq>
-          </p:childTnLst>
-        </p:cTn>
+        <p:cTn xmlns:p14="http://schemas.microsoft.com/office/powerpoint/2010/main" id="1" dur="indefinite" restart="never" nodeType="tmRoot"/>
       </p:par>
     </p:tnLst>
   </p:timing>
@@ -15415,15 +15362,7 @@
             </a:pPr>
             <a:r>
               <a:rPr lang="en-US" sz="4400" dirty="0" smtClean="0"/>
-              <a:t>gray </a:t>
-            </a:r>
-            <a:r>
-              <a:rPr lang="en-US" sz="4400" dirty="0" smtClean="0"/>
-              <a:t>edge :</a:t>
-            </a:r>
-            <a:r>
-              <a:rPr lang="en-US" sz="4400" dirty="0" smtClean="0"/>
-              <a:t>:= </a:t>
+              <a:t>gray edge ::= </a:t>
             </a:r>
           </a:p>
           <a:p>
@@ -15614,13 +15553,13 @@
   <p:clrMapOvr>
     <a:masterClrMapping/>
   </p:clrMapOvr>
-  <mc:AlternateContent xmlns:mc="http://schemas.openxmlformats.org/markup-compatibility/2006">
-    <mc:Choice xmlns:p14="http://schemas.microsoft.com/office/powerpoint/2010/main" Requires="p14">
+  <mc:AlternateContent xmlns:mc="http://schemas.openxmlformats.org/markup-compatibility/2006" xmlns:p14="http://schemas.microsoft.com/office/powerpoint/2010/main">
+    <mc:Choice Requires="p14">
       <p:transition spd="slow" p14:dur="1200">
         <p:fade/>
       </p:transition>
     </mc:Choice>
-    <mc:Fallback>
+    <mc:Fallback xmlns="">
       <p:transition xmlns:p14="http://schemas.microsoft.com/office/powerpoint/2010/main" spd="slow">
         <p:fade/>
       </p:transition>

</xml_diff>